<commit_message>
Updated ppt's and bit sim log
</commit_message>
<xml_diff>
--- a/Creo MO - Adding Gauge Length.pptx
+++ b/Creo MO - Adding Gauge Length.pptx
@@ -118,14 +118,37 @@
 <file path=ppt/revisionInfo.xml><?xml version="1.0" encoding="utf-8"?>
 <p1510:revInfo xmlns:a="http://schemas.openxmlformats.org/drawingml/2006/main" xmlns:r="http://schemas.openxmlformats.org/officeDocument/2006/relationships" xmlns:p1510="http://schemas.microsoft.com/office/powerpoint/2015/10/main">
   <p1510:revLst>
-    <p1510:client id="{A752195C-307F-D5CA-FA14-4D9D38934375}" v="277" dt="2024-07-29T15:49:48.792"/>
-    <p1510:client id="{C9E4581F-9166-FDC2-88EC-101CFAA95B4D}" v="340" dt="2024-07-30T19:26:04.007"/>
+    <p1510:client id="{DF3344A2-66CE-4906-6DA9-EFBCC1F09161}" v="2" dt="2024-08-12T13:48:20.290"/>
   </p1510:revLst>
 </p1510:revInfo>
 </file>
 
 <file path=ppt/changesInfos/changesInfo1.xml><?xml version="1.0" encoding="utf-8"?>
 <pc:chgInfo xmlns:a="http://schemas.openxmlformats.org/drawingml/2006/main" xmlns:r="http://schemas.openxmlformats.org/officeDocument/2006/relationships" xmlns:ac="http://schemas.microsoft.com/office/drawing/2013/main/command" xmlns:pc="http://schemas.microsoft.com/office/powerpoint/2013/main/command">
+  <pc:docChgLst>
+    <pc:chgData name="Justin Jones" userId="S::justin.jones@cnpcusa.com::d548d167-3381-4d70-866b-4efa696e272f" providerId="AD" clId="Web-{DF3344A2-66CE-4906-6DA9-EFBCC1F09161}"/>
+    <pc:docChg chg="modSld">
+      <pc:chgData name="Justin Jones" userId="S::justin.jones@cnpcusa.com::d548d167-3381-4d70-866b-4efa696e272f" providerId="AD" clId="Web-{DF3344A2-66CE-4906-6DA9-EFBCC1F09161}" dt="2024-08-12T13:48:20.290" v="1" actId="20577"/>
+      <pc:docMkLst>
+        <pc:docMk/>
+      </pc:docMkLst>
+      <pc:sldChg chg="modSp">
+        <pc:chgData name="Justin Jones" userId="S::justin.jones@cnpcusa.com::d548d167-3381-4d70-866b-4efa696e272f" providerId="AD" clId="Web-{DF3344A2-66CE-4906-6DA9-EFBCC1F09161}" dt="2024-08-12T13:48:20.290" v="1" actId="20577"/>
+        <pc:sldMkLst>
+          <pc:docMk/>
+          <pc:sldMk cId="3310921234" sldId="270"/>
+        </pc:sldMkLst>
+        <pc:spChg chg="mod">
+          <ac:chgData name="Justin Jones" userId="S::justin.jones@cnpcusa.com::d548d167-3381-4d70-866b-4efa696e272f" providerId="AD" clId="Web-{DF3344A2-66CE-4906-6DA9-EFBCC1F09161}" dt="2024-08-12T13:48:20.290" v="1" actId="20577"/>
+          <ac:spMkLst>
+            <pc:docMk/>
+            <pc:sldMk cId="3310921234" sldId="270"/>
+            <ac:spMk id="2" creationId="{00000000-0000-0000-0000-000000000000}"/>
+          </ac:spMkLst>
+        </pc:spChg>
+      </pc:sldChg>
+    </pc:docChg>
+  </pc:docChgLst>
   <pc:docChgLst>
     <pc:chgData name="Justin Jones" userId="S::justin.jones@cnpcusa.com::d548d167-3381-4d70-866b-4efa696e272f" providerId="AD" clId="Web-{C9E4581F-9166-FDC2-88EC-101CFAA95B4D}"/>
     <pc:docChg chg="addSld delSld modSld">
@@ -456,7 +479,7 @@
           <a:p>
             <a:fld id="{846CE7D5-CF57-46EF-B807-FDD0502418D4}" type="datetimeFigureOut">
               <a:rPr lang="en-US" smtClean="0"/>
-              <a:t>7/30/2024</a:t>
+              <a:t>8/12/2024</a:t>
             </a:fld>
             <a:endParaRPr lang="en-US"/>
           </a:p>
@@ -626,7 +649,7 @@
           <a:p>
             <a:fld id="{846CE7D5-CF57-46EF-B807-FDD0502418D4}" type="datetimeFigureOut">
               <a:rPr lang="en-US" smtClean="0"/>
-              <a:t>7/30/2024</a:t>
+              <a:t>8/12/2024</a:t>
             </a:fld>
             <a:endParaRPr lang="en-US"/>
           </a:p>
@@ -806,7 +829,7 @@
           <a:p>
             <a:fld id="{846CE7D5-CF57-46EF-B807-FDD0502418D4}" type="datetimeFigureOut">
               <a:rPr lang="en-US" smtClean="0"/>
-              <a:t>7/30/2024</a:t>
+              <a:t>8/12/2024</a:t>
             </a:fld>
             <a:endParaRPr lang="en-US"/>
           </a:p>
@@ -976,7 +999,7 @@
           <a:p>
             <a:fld id="{846CE7D5-CF57-46EF-B807-FDD0502418D4}" type="datetimeFigureOut">
               <a:rPr lang="en-US" smtClean="0"/>
-              <a:t>7/30/2024</a:t>
+              <a:t>8/12/2024</a:t>
             </a:fld>
             <a:endParaRPr lang="en-US"/>
           </a:p>
@@ -1222,7 +1245,7 @@
           <a:p>
             <a:fld id="{846CE7D5-CF57-46EF-B807-FDD0502418D4}" type="datetimeFigureOut">
               <a:rPr lang="en-US" smtClean="0"/>
-              <a:t>7/30/2024</a:t>
+              <a:t>8/12/2024</a:t>
             </a:fld>
             <a:endParaRPr lang="en-US"/>
           </a:p>
@@ -1454,7 +1477,7 @@
           <a:p>
             <a:fld id="{846CE7D5-CF57-46EF-B807-FDD0502418D4}" type="datetimeFigureOut">
               <a:rPr lang="en-US" smtClean="0"/>
-              <a:t>7/30/2024</a:t>
+              <a:t>8/12/2024</a:t>
             </a:fld>
             <a:endParaRPr lang="en-US"/>
           </a:p>
@@ -1821,7 +1844,7 @@
           <a:p>
             <a:fld id="{846CE7D5-CF57-46EF-B807-FDD0502418D4}" type="datetimeFigureOut">
               <a:rPr lang="en-US" smtClean="0"/>
-              <a:t>7/30/2024</a:t>
+              <a:t>8/12/2024</a:t>
             </a:fld>
             <a:endParaRPr lang="en-US"/>
           </a:p>
@@ -1939,7 +1962,7 @@
           <a:p>
             <a:fld id="{846CE7D5-CF57-46EF-B807-FDD0502418D4}" type="datetimeFigureOut">
               <a:rPr lang="en-US" smtClean="0"/>
-              <a:t>7/30/2024</a:t>
+              <a:t>8/12/2024</a:t>
             </a:fld>
             <a:endParaRPr lang="en-US"/>
           </a:p>
@@ -2034,7 +2057,7 @@
           <a:p>
             <a:fld id="{846CE7D5-CF57-46EF-B807-FDD0502418D4}" type="datetimeFigureOut">
               <a:rPr lang="en-US" smtClean="0"/>
-              <a:t>7/30/2024</a:t>
+              <a:t>8/12/2024</a:t>
             </a:fld>
             <a:endParaRPr lang="en-US"/>
           </a:p>
@@ -2311,7 +2334,7 @@
           <a:p>
             <a:fld id="{846CE7D5-CF57-46EF-B807-FDD0502418D4}" type="datetimeFigureOut">
               <a:rPr lang="en-US" smtClean="0"/>
-              <a:t>7/30/2024</a:t>
+              <a:t>8/12/2024</a:t>
             </a:fld>
             <a:endParaRPr lang="en-US"/>
           </a:p>
@@ -2568,7 +2591,7 @@
           <a:p>
             <a:fld id="{846CE7D5-CF57-46EF-B807-FDD0502418D4}" type="datetimeFigureOut">
               <a:rPr lang="en-US" smtClean="0"/>
-              <a:t>7/30/2024</a:t>
+              <a:t>8/12/2024</a:t>
             </a:fld>
             <a:endParaRPr lang="en-US"/>
           </a:p>
@@ -2781,7 +2804,7 @@
           <a:p>
             <a:fld id="{846CE7D5-CF57-46EF-B807-FDD0502418D4}" type="datetimeFigureOut">
               <a:rPr lang="en-US" smtClean="0"/>
-              <a:t>7/30/2024</a:t>
+              <a:t>8/12/2024</a:t>
             </a:fld>
             <a:endParaRPr lang="en-US"/>
           </a:p>
@@ -3205,6 +3228,10 @@
               <a:rPr lang="en-US" dirty="0"/>
               <a:t>Gauge Length Parameter</a:t>
             </a:r>
+            <a:br>
+              <a:rPr lang="en-US" dirty="0"/>
+            </a:br>
+            <a:endParaRPr lang="en-US" dirty="0"/>
           </a:p>
         </p:txBody>
       </p:sp>

</xml_diff>